<commit_message>
Formatted plots, added PowerPoint presentation in PDF format, updated README file
</commit_message>
<xml_diff>
--- a/AIStocksProject/Presentation_Tech_Giants_Face_Off.pptx
+++ b/AIStocksProject/Presentation_Tech_Giants_Face_Off.pptx
@@ -275,8 +275,11 @@
     </a:lvl9pPr>
   </p:defaultTextStyle>
   <p:extLst>
+    <p:ext uri="{EFAFB233-063F-42B5-8137-9DF3F51BA10A}">
+      <p15:sldGuideLst xmlns:p15="http://schemas.microsoft.com/office/powerpoint/2012/main"/>
+    </p:ext>
     <p:ext uri="GoogleSlidesCustomDataVersion2">
-      <go:slidesCustomData xmlns:go="http://customooxmlschemas.google.com/" xmlns:ahyp="http://schemas.microsoft.com/office/drawing/2018/hyperlinkcolor" xmlns:p15="http://schemas.microsoft.com/office/powerpoint/2012/main" xmlns:p14="http://schemas.microsoft.com/office/powerpoint/2010/main" xmlns:com="http://schemas.openxmlformats.org/drawingml/2006/compatibility" xmlns:pvml="urn:schemas-microsoft-com:office:powerpoint" xmlns:v="urn:schemas-microsoft-com:vml" xmlns:o="urn:schemas-microsoft-com:office:office" xmlns:dgm="http://schemas.openxmlformats.org/drawingml/2006/diagram" xmlns:c="http://schemas.openxmlformats.org/drawingml/2006/chart" xmlns:mv="urn:schemas-microsoft-com:mac:vml" xmlns:mc="http://schemas.openxmlformats.org/markup-compatibility/2006" xmlns="" r:id="rId35" roundtripDataSignature="AMtx7mgat75JKQBK3Ei7/OtG0sZsKQBa7Q=="/>
+      <go:slidesCustomData xmlns="" xmlns:mc="http://schemas.openxmlformats.org/markup-compatibility/2006" xmlns:mv="urn:schemas-microsoft-com:mac:vml" xmlns:c="http://schemas.openxmlformats.org/drawingml/2006/chart" xmlns:dgm="http://schemas.openxmlformats.org/drawingml/2006/diagram" xmlns:o="urn:schemas-microsoft-com:office:office" xmlns:v="urn:schemas-microsoft-com:vml" xmlns:pvml="urn:schemas-microsoft-com:office:powerpoint" xmlns:com="http://schemas.openxmlformats.org/drawingml/2006/compatibility" xmlns:p14="http://schemas.microsoft.com/office/powerpoint/2010/main" xmlns:p15="http://schemas.microsoft.com/office/powerpoint/2012/main" xmlns:ahyp="http://schemas.microsoft.com/office/drawing/2018/hyperlinkcolor" xmlns:go="http://customooxmlschemas.google.com/" r:id="rId35" roundtripDataSignature="AMtx7mgat75JKQBK3Ei7/OtG0sZsKQBa7Q=="/>
     </p:ext>
   </p:extLst>
 </p:presentation>
@@ -285,7 +288,7 @@
 <file path=ppt/revisionInfo.xml><?xml version="1.0" encoding="utf-8"?>
 <p1510:revInfo xmlns:a="http://schemas.openxmlformats.org/drawingml/2006/main" xmlns:r="http://schemas.openxmlformats.org/officeDocument/2006/relationships" xmlns:p1510="http://schemas.microsoft.com/office/powerpoint/2015/10/main">
   <p1510:revLst>
-    <p1510:client id="{A2DBCA16-B5D3-44CA-814D-908B49187BB2}" v="4" dt="2024-07-11T20:45:23.870"/>
+    <p1510:client id="{355C0980-1806-4730-B6C7-6712360F43D6}" v="6" dt="2024-07-19T07:48:17.864"/>
   </p1510:revLst>
 </p1510:revInfo>
 </file>
@@ -320,6 +323,193 @@
           <pc:docMk/>
           <pc:sldMk cId="0" sldId="271"/>
         </pc:sldMkLst>
+      </pc:sldChg>
+    </pc:docChg>
+  </pc:docChgLst>
+  <pc:docChgLst>
+    <pc:chgData name="Sabrina Linden" userId="4141cdfdf4223e57" providerId="LiveId" clId="{355C0980-1806-4730-B6C7-6712360F43D6}"/>
+    <pc:docChg chg="undo custSel addSld delSld modSld">
+      <pc:chgData name="Sabrina Linden" userId="4141cdfdf4223e57" providerId="LiveId" clId="{355C0980-1806-4730-B6C7-6712360F43D6}" dt="2024-07-19T07:48:21.488" v="125" actId="1076"/>
+      <pc:docMkLst>
+        <pc:docMk/>
+      </pc:docMkLst>
+      <pc:sldChg chg="addSp delSp modSp add del mod">
+        <pc:chgData name="Sabrina Linden" userId="4141cdfdf4223e57" providerId="LiveId" clId="{355C0980-1806-4730-B6C7-6712360F43D6}" dt="2024-07-19T07:05:02.787" v="6" actId="14100"/>
+        <pc:sldMkLst>
+          <pc:docMk/>
+          <pc:sldMk cId="0" sldId="262"/>
+        </pc:sldMkLst>
+        <pc:picChg chg="add mod">
+          <ac:chgData name="Sabrina Linden" userId="4141cdfdf4223e57" providerId="LiveId" clId="{355C0980-1806-4730-B6C7-6712360F43D6}" dt="2024-07-19T07:05:02.787" v="6" actId="14100"/>
+          <ac:picMkLst>
+            <pc:docMk/>
+            <pc:sldMk cId="0" sldId="262"/>
+            <ac:picMk id="3" creationId="{95471760-0B58-EE18-4A35-316B58D78923}"/>
+          </ac:picMkLst>
+        </pc:picChg>
+        <pc:picChg chg="del">
+          <ac:chgData name="Sabrina Linden" userId="4141cdfdf4223e57" providerId="LiveId" clId="{355C0980-1806-4730-B6C7-6712360F43D6}" dt="2024-07-19T07:04:37.293" v="2" actId="478"/>
+          <ac:picMkLst>
+            <pc:docMk/>
+            <pc:sldMk cId="0" sldId="262"/>
+            <ac:picMk id="141" creationId="{00000000-0000-0000-0000-000000000000}"/>
+          </ac:picMkLst>
+        </pc:picChg>
+      </pc:sldChg>
+      <pc:sldChg chg="addSp delSp modSp mod">
+        <pc:chgData name="Sabrina Linden" userId="4141cdfdf4223e57" providerId="LiveId" clId="{355C0980-1806-4730-B6C7-6712360F43D6}" dt="2024-07-19T07:48:21.488" v="125" actId="1076"/>
+        <pc:sldMkLst>
+          <pc:docMk/>
+          <pc:sldMk cId="0" sldId="263"/>
+        </pc:sldMkLst>
+        <pc:spChg chg="add del mod">
+          <ac:chgData name="Sabrina Linden" userId="4141cdfdf4223e57" providerId="LiveId" clId="{355C0980-1806-4730-B6C7-6712360F43D6}" dt="2024-07-19T07:47:47.186" v="120" actId="478"/>
+          <ac:spMkLst>
+            <pc:docMk/>
+            <pc:sldMk cId="0" sldId="263"/>
+            <ac:spMk id="4" creationId="{6F7662D2-7FE8-72F7-683B-604742F6E3AB}"/>
+          </ac:spMkLst>
+        </pc:spChg>
+        <pc:spChg chg="add mod">
+          <ac:chgData name="Sabrina Linden" userId="4141cdfdf4223e57" providerId="LiveId" clId="{355C0980-1806-4730-B6C7-6712360F43D6}" dt="2024-07-19T07:48:21.488" v="125" actId="1076"/>
+          <ac:spMkLst>
+            <pc:docMk/>
+            <pc:sldMk cId="0" sldId="263"/>
+            <ac:spMk id="7" creationId="{FEBC5C18-4D9A-B52C-840F-4F85228C115B}"/>
+          </ac:spMkLst>
+        </pc:spChg>
+        <pc:picChg chg="add del mod">
+          <ac:chgData name="Sabrina Linden" userId="4141cdfdf4223e57" providerId="LiveId" clId="{355C0980-1806-4730-B6C7-6712360F43D6}" dt="2024-07-19T07:47:51.509" v="121" actId="478"/>
+          <ac:picMkLst>
+            <pc:docMk/>
+            <pc:sldMk cId="0" sldId="263"/>
+            <ac:picMk id="3" creationId="{EEDAFF54-FBB6-3C63-DD8E-3FFB3371F2E2}"/>
+          </ac:picMkLst>
+        </pc:picChg>
+        <pc:picChg chg="add mod">
+          <ac:chgData name="Sabrina Linden" userId="4141cdfdf4223e57" providerId="LiveId" clId="{355C0980-1806-4730-B6C7-6712360F43D6}" dt="2024-07-19T07:48:03.054" v="123" actId="14100"/>
+          <ac:picMkLst>
+            <pc:docMk/>
+            <pc:sldMk cId="0" sldId="263"/>
+            <ac:picMk id="6" creationId="{0519A7A8-DC24-032D-52E5-95707193943F}"/>
+          </ac:picMkLst>
+        </pc:picChg>
+        <pc:picChg chg="del">
+          <ac:chgData name="Sabrina Linden" userId="4141cdfdf4223e57" providerId="LiveId" clId="{355C0980-1806-4730-B6C7-6712360F43D6}" dt="2024-07-19T07:45:38.241" v="113" actId="478"/>
+          <ac:picMkLst>
+            <pc:docMk/>
+            <pc:sldMk cId="0" sldId="263"/>
+            <ac:picMk id="150" creationId="{00000000-0000-0000-0000-000000000000}"/>
+          </ac:picMkLst>
+        </pc:picChg>
+      </pc:sldChg>
+      <pc:sldChg chg="addSp modSp mod">
+        <pc:chgData name="Sabrina Linden" userId="4141cdfdf4223e57" providerId="LiveId" clId="{355C0980-1806-4730-B6C7-6712360F43D6}" dt="2024-07-19T07:19:16.818" v="112" actId="1076"/>
+        <pc:sldMkLst>
+          <pc:docMk/>
+          <pc:sldMk cId="0" sldId="264"/>
+        </pc:sldMkLst>
+        <pc:spChg chg="add mod">
+          <ac:chgData name="Sabrina Linden" userId="4141cdfdf4223e57" providerId="LiveId" clId="{355C0980-1806-4730-B6C7-6712360F43D6}" dt="2024-07-19T07:19:16.818" v="112" actId="1076"/>
+          <ac:spMkLst>
+            <pc:docMk/>
+            <pc:sldMk cId="0" sldId="264"/>
+            <ac:spMk id="2" creationId="{1AB7A468-FA89-0915-3EB2-6C01EDCDF5B1}"/>
+          </ac:spMkLst>
+        </pc:spChg>
+      </pc:sldChg>
+      <pc:sldChg chg="modSp mod">
+        <pc:chgData name="Sabrina Linden" userId="4141cdfdf4223e57" providerId="LiveId" clId="{355C0980-1806-4730-B6C7-6712360F43D6}" dt="2024-07-19T07:17:57.493" v="82" actId="208"/>
+        <pc:sldMkLst>
+          <pc:docMk/>
+          <pc:sldMk cId="0" sldId="265"/>
+        </pc:sldMkLst>
+        <pc:spChg chg="mod">
+          <ac:chgData name="Sabrina Linden" userId="4141cdfdf4223e57" providerId="LiveId" clId="{355C0980-1806-4730-B6C7-6712360F43D6}" dt="2024-07-19T07:17:57.493" v="82" actId="208"/>
+          <ac:spMkLst>
+            <pc:docMk/>
+            <pc:sldMk cId="0" sldId="265"/>
+            <ac:spMk id="168" creationId="{00000000-0000-0000-0000-000000000000}"/>
+          </ac:spMkLst>
+        </pc:spChg>
+      </pc:sldChg>
+      <pc:sldChg chg="addSp delSp modSp mod">
+        <pc:chgData name="Sabrina Linden" userId="4141cdfdf4223e57" providerId="LiveId" clId="{355C0980-1806-4730-B6C7-6712360F43D6}" dt="2024-07-19T07:15:02.537" v="27" actId="207"/>
+        <pc:sldMkLst>
+          <pc:docMk/>
+          <pc:sldMk cId="0" sldId="267"/>
+        </pc:sldMkLst>
+        <pc:spChg chg="add mod">
+          <ac:chgData name="Sabrina Linden" userId="4141cdfdf4223e57" providerId="LiveId" clId="{355C0980-1806-4730-B6C7-6712360F43D6}" dt="2024-07-19T07:15:02.537" v="27" actId="207"/>
+          <ac:spMkLst>
+            <pc:docMk/>
+            <pc:sldMk cId="0" sldId="267"/>
+            <ac:spMk id="4" creationId="{4005A56B-122D-670E-95A9-59E40B01EA6A}"/>
+          </ac:spMkLst>
+        </pc:spChg>
+        <pc:picChg chg="add mod">
+          <ac:chgData name="Sabrina Linden" userId="4141cdfdf4223e57" providerId="LiveId" clId="{355C0980-1806-4730-B6C7-6712360F43D6}" dt="2024-07-19T07:13:08.154" v="19" actId="14100"/>
+          <ac:picMkLst>
+            <pc:docMk/>
+            <pc:sldMk cId="0" sldId="267"/>
+            <ac:picMk id="3" creationId="{D5BF0BF3-6894-E691-28C1-FE29910CB755}"/>
+          </ac:picMkLst>
+        </pc:picChg>
+        <pc:picChg chg="del">
+          <ac:chgData name="Sabrina Linden" userId="4141cdfdf4223e57" providerId="LiveId" clId="{355C0980-1806-4730-B6C7-6712360F43D6}" dt="2024-07-19T07:12:19.658" v="14" actId="478"/>
+          <ac:picMkLst>
+            <pc:docMk/>
+            <pc:sldMk cId="0" sldId="267"/>
+            <ac:picMk id="185" creationId="{00000000-0000-0000-0000-000000000000}"/>
+          </ac:picMkLst>
+        </pc:picChg>
+      </pc:sldChg>
+      <pc:sldChg chg="addSp delSp modSp mod">
+        <pc:chgData name="Sabrina Linden" userId="4141cdfdf4223e57" providerId="LiveId" clId="{355C0980-1806-4730-B6C7-6712360F43D6}" dt="2024-07-19T07:18:31.490" v="110" actId="1076"/>
+        <pc:sldMkLst>
+          <pc:docMk/>
+          <pc:sldMk cId="0" sldId="268"/>
+        </pc:sldMkLst>
+        <pc:spChg chg="add del mod">
+          <ac:chgData name="Sabrina Linden" userId="4141cdfdf4223e57" providerId="LiveId" clId="{355C0980-1806-4730-B6C7-6712360F43D6}" dt="2024-07-19T07:18:23.575" v="108" actId="478"/>
+          <ac:spMkLst>
+            <pc:docMk/>
+            <pc:sldMk cId="0" sldId="268"/>
+            <ac:spMk id="4" creationId="{60EC1A1F-40D1-854E-1341-A00035E7A259}"/>
+          </ac:spMkLst>
+        </pc:spChg>
+        <pc:spChg chg="add mod">
+          <ac:chgData name="Sabrina Linden" userId="4141cdfdf4223e57" providerId="LiveId" clId="{355C0980-1806-4730-B6C7-6712360F43D6}" dt="2024-07-19T07:18:15.542" v="107" actId="207"/>
+          <ac:spMkLst>
+            <pc:docMk/>
+            <pc:sldMk cId="0" sldId="268"/>
+            <ac:spMk id="5" creationId="{8154D842-05BF-717C-30EF-56AE8FB24010}"/>
+          </ac:spMkLst>
+        </pc:spChg>
+        <pc:spChg chg="add mod">
+          <ac:chgData name="Sabrina Linden" userId="4141cdfdf4223e57" providerId="LiveId" clId="{355C0980-1806-4730-B6C7-6712360F43D6}" dt="2024-07-19T07:18:31.490" v="110" actId="1076"/>
+          <ac:spMkLst>
+            <pc:docMk/>
+            <pc:sldMk cId="0" sldId="268"/>
+            <ac:spMk id="6" creationId="{0AD02F66-48F4-8070-E070-03D9100FF853}"/>
+          </ac:spMkLst>
+        </pc:spChg>
+        <pc:picChg chg="add mod">
+          <ac:chgData name="Sabrina Linden" userId="4141cdfdf4223e57" providerId="LiveId" clId="{355C0980-1806-4730-B6C7-6712360F43D6}" dt="2024-07-19T07:11:17.577" v="13" actId="14100"/>
+          <ac:picMkLst>
+            <pc:docMk/>
+            <pc:sldMk cId="0" sldId="268"/>
+            <ac:picMk id="3" creationId="{D4B14B88-60A1-3CBD-D12E-0F37D9E7CC90}"/>
+          </ac:picMkLst>
+        </pc:picChg>
+        <pc:picChg chg="del">
+          <ac:chgData name="Sabrina Linden" userId="4141cdfdf4223e57" providerId="LiveId" clId="{355C0980-1806-4730-B6C7-6712360F43D6}" dt="2024-07-19T07:10:09.586" v="7" actId="478"/>
+          <ac:picMkLst>
+            <pc:docMk/>
+            <pc:sldMk cId="0" sldId="268"/>
+            <ac:picMk id="194" creationId="{00000000-0000-0000-0000-000000000000}"/>
+          </ac:picMkLst>
+        </pc:picChg>
       </pc:sldChg>
     </pc:docChg>
   </pc:docChgLst>
@@ -19053,11 +19243,11 @@
             </a:avLst>
           </a:prstGeom>
           <a:solidFill>
-            <a:schemeClr val="lt2"/>
+            <a:srgbClr val="FF0000"/>
           </a:solidFill>
           <a:ln w="9525" cap="flat" cmpd="sng">
             <a:solidFill>
-              <a:srgbClr val="FF0000"/>
+              <a:schemeClr val="tx1"/>
             </a:solidFill>
             <a:prstDash val="solid"/>
             <a:round/>
@@ -19090,8 +19280,11 @@
             </a:pPr>
             <a:endParaRPr sz="1400" b="0" i="0" u="none" strike="noStrike" cap="none" dirty="0">
               <a:solidFill>
-                <a:srgbClr val="000000"/>
+                <a:srgbClr val="FF0000"/>
               </a:solidFill>
+              <a:highlight>
+                <a:srgbClr val="FF0000"/>
+              </a:highlight>
               <a:latin typeface="Avenir"/>
               <a:ea typeface="Avenir"/>
               <a:cs typeface="Avenir"/>
@@ -19733,33 +19926,6 @@
           </a:p>
         </p:txBody>
       </p:sp>
-      <p:pic>
-        <p:nvPicPr>
-          <p:cNvPr id="185" name="Google Shape;185;p8"/>
-          <p:cNvPicPr preferRelativeResize="0"/>
-          <p:nvPr/>
-        </p:nvPicPr>
-        <p:blipFill rotWithShape="1">
-          <a:blip r:embed="rId3">
-            <a:alphaModFix/>
-          </a:blip>
-          <a:srcRect/>
-          <a:stretch/>
-        </p:blipFill>
-        <p:spPr>
-          <a:xfrm>
-            <a:off x="0" y="136525"/>
-            <a:ext cx="11862816" cy="6629500"/>
-          </a:xfrm>
-          <a:prstGeom prst="rect">
-            <a:avLst/>
-          </a:prstGeom>
-          <a:noFill/>
-          <a:ln>
-            <a:noFill/>
-          </a:ln>
-        </p:spPr>
-      </p:pic>
       <p:sp>
         <p:nvSpPr>
           <p:cNvPr id="186" name="Google Shape;186;p8"/>
@@ -19857,6 +20023,89 @@
               <a:buNone/>
             </a:pPr>
             <a:endParaRPr dirty="0"/>
+          </a:p>
+        </p:txBody>
+      </p:sp>
+      <p:pic>
+        <p:nvPicPr>
+          <p:cNvPr id="3" name="Picture 2">
+            <a:extLst>
+              <a:ext uri="{FF2B5EF4-FFF2-40B4-BE49-F238E27FC236}">
+                <a16:creationId xmlns:a16="http://schemas.microsoft.com/office/drawing/2014/main" id="{D5BF0BF3-6894-E691-28C1-FE29910CB755}"/>
+              </a:ext>
+            </a:extLst>
+          </p:cNvPr>
+          <p:cNvPicPr>
+            <a:picLocks noChangeAspect="1"/>
+          </p:cNvPicPr>
+          <p:nvPr/>
+        </p:nvPicPr>
+        <p:blipFill>
+          <a:blip r:embed="rId3"/>
+          <a:stretch>
+            <a:fillRect/>
+          </a:stretch>
+        </p:blipFill>
+        <p:spPr>
+          <a:xfrm>
+            <a:off x="513800" y="64009"/>
+            <a:ext cx="11241249" cy="6657464"/>
+          </a:xfrm>
+          <a:prstGeom prst="rect">
+            <a:avLst/>
+          </a:prstGeom>
+        </p:spPr>
+      </p:pic>
+      <p:sp>
+        <p:nvSpPr>
+          <p:cNvPr id="4" name="Arrow: Right 3">
+            <a:extLst>
+              <a:ext uri="{FF2B5EF4-FFF2-40B4-BE49-F238E27FC236}">
+                <a16:creationId xmlns:a16="http://schemas.microsoft.com/office/drawing/2014/main" id="{4005A56B-122D-670E-95A9-59E40B01EA6A}"/>
+              </a:ext>
+            </a:extLst>
+          </p:cNvPr>
+          <p:cNvSpPr/>
+          <p:nvPr/>
+        </p:nvSpPr>
+        <p:spPr>
+          <a:xfrm>
+            <a:off x="761999" y="5084064"/>
+            <a:ext cx="978408" cy="484632"/>
+          </a:xfrm>
+          <a:prstGeom prst="rightArrow">
+            <a:avLst/>
+          </a:prstGeom>
+          <a:solidFill>
+            <a:srgbClr val="FF0000"/>
+          </a:solidFill>
+        </p:spPr>
+        <p:style>
+          <a:lnRef idx="2">
+            <a:schemeClr val="accent1">
+              <a:shade val="15000"/>
+            </a:schemeClr>
+          </a:lnRef>
+          <a:fillRef idx="1">
+            <a:schemeClr val="accent1"/>
+          </a:fillRef>
+          <a:effectRef idx="0">
+            <a:schemeClr val="accent1"/>
+          </a:effectRef>
+          <a:fontRef idx="minor">
+            <a:schemeClr val="lt1"/>
+          </a:fontRef>
+        </p:style>
+        <p:txBody>
+          <a:bodyPr rtlCol="0" anchor="ctr"/>
+          <a:lstStyle/>
+          <a:p>
+            <a:pPr algn="ctr"/>
+            <a:endParaRPr lang="en-US">
+              <a:solidFill>
+                <a:srgbClr val="FF0000"/>
+              </a:solidFill>
+            </a:endParaRPr>
           </a:p>
         </p:txBody>
       </p:sp>
@@ -20029,33 +20278,6 @@
           </a:p>
         </p:txBody>
       </p:sp>
-      <p:pic>
-        <p:nvPicPr>
-          <p:cNvPr id="194" name="Google Shape;194;g2e5b37fad8a_2_56"/>
-          <p:cNvPicPr preferRelativeResize="0"/>
-          <p:nvPr/>
-        </p:nvPicPr>
-        <p:blipFill rotWithShape="1">
-          <a:blip r:embed="rId3">
-            <a:alphaModFix/>
-          </a:blip>
-          <a:srcRect/>
-          <a:stretch/>
-        </p:blipFill>
-        <p:spPr>
-          <a:xfrm>
-            <a:off x="636850" y="123825"/>
-            <a:ext cx="11386600" cy="6610350"/>
-          </a:xfrm>
-          <a:prstGeom prst="rect">
-            <a:avLst/>
-          </a:prstGeom>
-          <a:noFill/>
-          <a:ln>
-            <a:noFill/>
-          </a:ln>
-        </p:spPr>
-      </p:pic>
       <p:sp>
         <p:nvSpPr>
           <p:cNvPr id="195" name="Google Shape;195;g2e5b37fad8a_2_56"/>
@@ -20156,6 +20378,146 @@
               <a:buNone/>
             </a:pPr>
             <a:endParaRPr dirty="0"/>
+          </a:p>
+        </p:txBody>
+      </p:sp>
+      <p:pic>
+        <p:nvPicPr>
+          <p:cNvPr id="3" name="Picture 2">
+            <a:extLst>
+              <a:ext uri="{FF2B5EF4-FFF2-40B4-BE49-F238E27FC236}">
+                <a16:creationId xmlns:a16="http://schemas.microsoft.com/office/drawing/2014/main" id="{D4B14B88-60A1-3CBD-D12E-0F37D9E7CC90}"/>
+              </a:ext>
+            </a:extLst>
+          </p:cNvPr>
+          <p:cNvPicPr>
+            <a:picLocks noChangeAspect="1"/>
+          </p:cNvPicPr>
+          <p:nvPr/>
+        </p:nvPicPr>
+        <p:blipFill>
+          <a:blip r:embed="rId3"/>
+          <a:stretch>
+            <a:fillRect/>
+          </a:stretch>
+        </p:blipFill>
+        <p:spPr>
+          <a:xfrm>
+            <a:off x="338328" y="136525"/>
+            <a:ext cx="11416722" cy="6584950"/>
+          </a:xfrm>
+          <a:prstGeom prst="rect">
+            <a:avLst/>
+          </a:prstGeom>
+        </p:spPr>
+      </p:pic>
+      <p:sp>
+        <p:nvSpPr>
+          <p:cNvPr id="5" name="Arrow: Right 4">
+            <a:extLst>
+              <a:ext uri="{FF2B5EF4-FFF2-40B4-BE49-F238E27FC236}">
+                <a16:creationId xmlns:a16="http://schemas.microsoft.com/office/drawing/2014/main" id="{8154D842-05BF-717C-30EF-56AE8FB24010}"/>
+              </a:ext>
+            </a:extLst>
+          </p:cNvPr>
+          <p:cNvSpPr/>
+          <p:nvPr/>
+        </p:nvSpPr>
+        <p:spPr>
+          <a:xfrm>
+            <a:off x="338328" y="3938778"/>
+            <a:ext cx="978408" cy="365100"/>
+          </a:xfrm>
+          <a:prstGeom prst="rightArrow">
+            <a:avLst/>
+          </a:prstGeom>
+          <a:solidFill>
+            <a:srgbClr val="FF0000">
+              <a:alpha val="46000"/>
+            </a:srgbClr>
+          </a:solidFill>
+        </p:spPr>
+        <p:style>
+          <a:lnRef idx="2">
+            <a:schemeClr val="accent1">
+              <a:shade val="15000"/>
+            </a:schemeClr>
+          </a:lnRef>
+          <a:fillRef idx="1">
+            <a:schemeClr val="accent1"/>
+          </a:fillRef>
+          <a:effectRef idx="0">
+            <a:schemeClr val="accent1"/>
+          </a:effectRef>
+          <a:fontRef idx="minor">
+            <a:schemeClr val="lt1"/>
+          </a:fontRef>
+        </p:style>
+        <p:txBody>
+          <a:bodyPr rtlCol="0" anchor="ctr"/>
+          <a:lstStyle/>
+          <a:p>
+            <a:pPr algn="ctr"/>
+            <a:endParaRPr lang="en-US">
+              <a:solidFill>
+                <a:srgbClr val="FF0000"/>
+              </a:solidFill>
+            </a:endParaRPr>
+          </a:p>
+        </p:txBody>
+      </p:sp>
+      <p:sp>
+        <p:nvSpPr>
+          <p:cNvPr id="6" name="Arrow: Right 5">
+            <a:extLst>
+              <a:ext uri="{FF2B5EF4-FFF2-40B4-BE49-F238E27FC236}">
+                <a16:creationId xmlns:a16="http://schemas.microsoft.com/office/drawing/2014/main" id="{0AD02F66-48F4-8070-E070-03D9100FF853}"/>
+              </a:ext>
+            </a:extLst>
+          </p:cNvPr>
+          <p:cNvSpPr/>
+          <p:nvPr/>
+        </p:nvSpPr>
+        <p:spPr>
+          <a:xfrm>
+            <a:off x="324800" y="5609761"/>
+            <a:ext cx="978408" cy="365100"/>
+          </a:xfrm>
+          <a:prstGeom prst="rightArrow">
+            <a:avLst/>
+          </a:prstGeom>
+          <a:solidFill>
+            <a:srgbClr val="FF0000">
+              <a:alpha val="46000"/>
+            </a:srgbClr>
+          </a:solidFill>
+        </p:spPr>
+        <p:style>
+          <a:lnRef idx="2">
+            <a:schemeClr val="accent1">
+              <a:shade val="15000"/>
+            </a:schemeClr>
+          </a:lnRef>
+          <a:fillRef idx="1">
+            <a:schemeClr val="accent1"/>
+          </a:fillRef>
+          <a:effectRef idx="0">
+            <a:schemeClr val="accent1"/>
+          </a:effectRef>
+          <a:fontRef idx="minor">
+            <a:schemeClr val="lt1"/>
+          </a:fontRef>
+        </p:style>
+        <p:txBody>
+          <a:bodyPr rtlCol="0" anchor="ctr"/>
+          <a:lstStyle/>
+          <a:p>
+            <a:pPr algn="ctr"/>
+            <a:endParaRPr lang="en-US">
+              <a:solidFill>
+                <a:srgbClr val="FF0000"/>
+              </a:solidFill>
+            </a:endParaRPr>
           </a:p>
         </p:txBody>
       </p:sp>
@@ -25135,7 +25497,7 @@
               <a:rPr lang="en-US" sz="4000" b="1" dirty="0">
                 <a:extLst>
                   <a:ext uri="http://customooxmlschemas.google.com/">
-                    <go:slidesCustomData xmlns:go="http://customooxmlschemas.google.com/" xmlns:ahyp="http://schemas.microsoft.com/office/drawing/2018/hyperlinkcolor" xmlns:p15="http://schemas.microsoft.com/office/powerpoint/2012/main" xmlns:p14="http://schemas.microsoft.com/office/powerpoint/2010/main" xmlns:com="http://schemas.openxmlformats.org/drawingml/2006/compatibility" xmlns:pvml="urn:schemas-microsoft-com:office:powerpoint" xmlns:v="urn:schemas-microsoft-com:vml" xmlns:o="urn:schemas-microsoft-com:office:office" xmlns:dgm="http://schemas.openxmlformats.org/drawingml/2006/diagram" xmlns:c="http://schemas.openxmlformats.org/drawingml/2006/chart" xmlns:mv="urn:schemas-microsoft-com:mac:vml" xmlns:mc="http://schemas.openxmlformats.org/markup-compatibility/2006" xmlns="" textRoundtripDataId="0"/>
+                    <go:slidesCustomData xmlns="" xmlns:mc="http://schemas.openxmlformats.org/markup-compatibility/2006" xmlns:mv="urn:schemas-microsoft-com:mac:vml" xmlns:c="http://schemas.openxmlformats.org/drawingml/2006/chart" xmlns:dgm="http://schemas.openxmlformats.org/drawingml/2006/diagram" xmlns:o="urn:schemas-microsoft-com:office:office" xmlns:v="urn:schemas-microsoft-com:vml" xmlns:pvml="urn:schemas-microsoft-com:office:powerpoint" xmlns:com="http://schemas.openxmlformats.org/drawingml/2006/compatibility" xmlns:p14="http://schemas.microsoft.com/office/powerpoint/2010/main" xmlns:p15="http://schemas.microsoft.com/office/powerpoint/2012/main" xmlns:ahyp="http://schemas.microsoft.com/office/drawing/2018/hyperlinkcolor" xmlns:go="http://customooxmlschemas.google.com/" textRoundtripDataId="0"/>
                   </a:ext>
                 </a:extLst>
               </a:rPr>
@@ -28899,29 +29261,32 @@
       </p:sp>
       <p:pic>
         <p:nvPicPr>
-          <p:cNvPr id="141" name="Google Shape;141;p4"/>
-          <p:cNvPicPr preferRelativeResize="0"/>
+          <p:cNvPr id="3" name="Picture 2">
+            <a:extLst>
+              <a:ext uri="{FF2B5EF4-FFF2-40B4-BE49-F238E27FC236}">
+                <a16:creationId xmlns:a16="http://schemas.microsoft.com/office/drawing/2014/main" id="{95471760-0B58-EE18-4A35-316B58D78923}"/>
+              </a:ext>
+            </a:extLst>
+          </p:cNvPr>
+          <p:cNvPicPr>
+            <a:picLocks noChangeAspect="1"/>
+          </p:cNvPicPr>
           <p:nvPr/>
         </p:nvPicPr>
-        <p:blipFill rotWithShape="1">
-          <a:blip r:embed="rId3">
-            <a:alphaModFix/>
-          </a:blip>
-          <a:srcRect/>
-          <a:stretch/>
+        <p:blipFill>
+          <a:blip r:embed="rId3"/>
+          <a:stretch>
+            <a:fillRect/>
+          </a:stretch>
         </p:blipFill>
         <p:spPr>
           <a:xfrm>
-            <a:off x="460999" y="246888"/>
-            <a:ext cx="11611401" cy="6497076"/>
+            <a:off x="489755" y="56062"/>
+            <a:ext cx="11406589" cy="6684985"/>
           </a:xfrm>
           <a:prstGeom prst="rect">
             <a:avLst/>
           </a:prstGeom>
-          <a:noFill/>
-          <a:ln>
-            <a:noFill/>
-          </a:ln>
         </p:spPr>
       </p:pic>
     </p:spTree>
@@ -29237,31 +29602,89 @@
       </p:sp>
       <p:pic>
         <p:nvPicPr>
-          <p:cNvPr id="150" name="Google Shape;150;g2e66350fd99_24_9"/>
-          <p:cNvPicPr preferRelativeResize="0"/>
+          <p:cNvPr id="6" name="Picture 5">
+            <a:extLst>
+              <a:ext uri="{FF2B5EF4-FFF2-40B4-BE49-F238E27FC236}">
+                <a16:creationId xmlns:a16="http://schemas.microsoft.com/office/drawing/2014/main" id="{0519A7A8-DC24-032D-52E5-95707193943F}"/>
+              </a:ext>
+            </a:extLst>
+          </p:cNvPr>
+          <p:cNvPicPr>
+            <a:picLocks noChangeAspect="1"/>
+          </p:cNvPicPr>
           <p:nvPr/>
         </p:nvPicPr>
-        <p:blipFill rotWithShape="1">
-          <a:blip r:embed="rId3">
-            <a:alphaModFix/>
-          </a:blip>
-          <a:srcRect/>
-          <a:stretch/>
+        <p:blipFill>
+          <a:blip r:embed="rId3"/>
+          <a:stretch>
+            <a:fillRect/>
+          </a:stretch>
         </p:blipFill>
         <p:spPr>
           <a:xfrm>
-            <a:off x="602418" y="468400"/>
-            <a:ext cx="11152632" cy="5715000"/>
+            <a:off x="119600" y="486251"/>
+            <a:ext cx="12072400" cy="5885497"/>
           </a:xfrm>
           <a:prstGeom prst="rect">
             <a:avLst/>
           </a:prstGeom>
-          <a:noFill/>
-          <a:ln>
-            <a:noFill/>
-          </a:ln>
         </p:spPr>
       </p:pic>
+      <p:sp>
+        <p:nvSpPr>
+          <p:cNvPr id="7" name="Arrow: Right 6">
+            <a:extLst>
+              <a:ext uri="{FF2B5EF4-FFF2-40B4-BE49-F238E27FC236}">
+                <a16:creationId xmlns:a16="http://schemas.microsoft.com/office/drawing/2014/main" id="{FEBC5C18-4D9A-B52C-840F-4F85228C115B}"/>
+              </a:ext>
+            </a:extLst>
+          </p:cNvPr>
+          <p:cNvSpPr/>
+          <p:nvPr/>
+        </p:nvSpPr>
+        <p:spPr>
+          <a:xfrm>
+            <a:off x="119600" y="5407360"/>
+            <a:ext cx="978408" cy="365100"/>
+          </a:xfrm>
+          <a:prstGeom prst="rightArrow">
+            <a:avLst/>
+          </a:prstGeom>
+          <a:solidFill>
+            <a:srgbClr val="FF0000">
+              <a:alpha val="46000"/>
+            </a:srgbClr>
+          </a:solidFill>
+        </p:spPr>
+        <p:style>
+          <a:lnRef idx="2">
+            <a:schemeClr val="accent1">
+              <a:shade val="15000"/>
+            </a:schemeClr>
+          </a:lnRef>
+          <a:fillRef idx="1">
+            <a:schemeClr val="accent1"/>
+          </a:fillRef>
+          <a:effectRef idx="0">
+            <a:schemeClr val="accent1"/>
+          </a:effectRef>
+          <a:fontRef idx="minor">
+            <a:schemeClr val="lt1"/>
+          </a:fontRef>
+        </p:style>
+        <p:txBody>
+          <a:bodyPr rtlCol="0" anchor="ctr"/>
+          <a:lstStyle/>
+          <a:p>
+            <a:pPr algn="ctr"/>
+            <a:endParaRPr lang="en-US">
+              <a:solidFill>
+                <a:srgbClr val="FF0000"/>
+              </a:solidFill>
+            </a:endParaRPr>
+          </a:p>
+        </p:txBody>
+      </p:sp>
     </p:spTree>
   </p:cSld>
   <p:clrMapOvr>
@@ -29597,6 +30020,61 @@
               <a:t>9</a:t>
             </a:fld>
             <a:endParaRPr dirty="0"/>
+          </a:p>
+        </p:txBody>
+      </p:sp>
+      <p:sp>
+        <p:nvSpPr>
+          <p:cNvPr id="2" name="Arrow: Right 1">
+            <a:extLst>
+              <a:ext uri="{FF2B5EF4-FFF2-40B4-BE49-F238E27FC236}">
+                <a16:creationId xmlns:a16="http://schemas.microsoft.com/office/drawing/2014/main" id="{1AB7A468-FA89-0915-3EB2-6C01EDCDF5B1}"/>
+              </a:ext>
+            </a:extLst>
+          </p:cNvPr>
+          <p:cNvSpPr/>
+          <p:nvPr/>
+        </p:nvSpPr>
+        <p:spPr>
+          <a:xfrm>
+            <a:off x="689310" y="5000960"/>
+            <a:ext cx="978408" cy="365100"/>
+          </a:xfrm>
+          <a:prstGeom prst="rightArrow">
+            <a:avLst/>
+          </a:prstGeom>
+          <a:solidFill>
+            <a:srgbClr val="FF0000">
+              <a:alpha val="46000"/>
+            </a:srgbClr>
+          </a:solidFill>
+        </p:spPr>
+        <p:style>
+          <a:lnRef idx="2">
+            <a:schemeClr val="accent1">
+              <a:shade val="15000"/>
+            </a:schemeClr>
+          </a:lnRef>
+          <a:fillRef idx="1">
+            <a:schemeClr val="accent1"/>
+          </a:fillRef>
+          <a:effectRef idx="0">
+            <a:schemeClr val="accent1"/>
+          </a:effectRef>
+          <a:fontRef idx="minor">
+            <a:schemeClr val="lt1"/>
+          </a:fontRef>
+        </p:style>
+        <p:txBody>
+          <a:bodyPr rtlCol="0" anchor="ctr"/>
+          <a:lstStyle/>
+          <a:p>
+            <a:pPr algn="ctr"/>
+            <a:endParaRPr lang="en-US">
+              <a:solidFill>
+                <a:srgbClr val="FF0000"/>
+              </a:solidFill>
+            </a:endParaRPr>
           </a:p>
         </p:txBody>
       </p:sp>

</xml_diff>